<commit_message>
like icon on the role reversal is bigger and removed the number
</commit_message>
<xml_diff>
--- a/public/js/tasks/social_media/media/Social_media_task_instructions_06_29_2022.pptx
+++ b/public/js/tasks/social_media/media/Social_media_task_instructions_06_29_2022.pptx
@@ -17981,7 +17981,7 @@
             </a:pPr>
             <a:r>
               <a:rPr lang="en-US" dirty="0"/>
-              <a:t>If you were instructed to choose the right topic on the third </a:t>
+              <a:t>If you were instructed to choose the right topic on the second </a:t>
             </a:r>
             <a:r>
               <a:rPr lang="en-US" dirty="0">
@@ -18661,7 +18661,7 @@
             </a:r>
             <a:r>
               <a:rPr lang="en-US" dirty="0"/>
-              <a:t> where you only have one option.</a:t>
+              <a:t> where you can only choose one topic.</a:t>
             </a:r>
           </a:p>
         </p:txBody>

</xml_diff>